<commit_message>
Added report and started populating content
</commit_message>
<xml_diff>
--- a/Report_Presentation/Presentation.pptx
+++ b/Report_Presentation/Presentation.pptx
@@ -9,12 +9,11 @@
     <p:sldId id="262" r:id="rId3"/>
     <p:sldId id="267" r:id="rId4"/>
     <p:sldId id="257" r:id="rId5"/>
-    <p:sldId id="268" r:id="rId6"/>
-    <p:sldId id="263" r:id="rId7"/>
-    <p:sldId id="269" r:id="rId8"/>
-    <p:sldId id="264" r:id="rId9"/>
-    <p:sldId id="265" r:id="rId10"/>
-    <p:sldId id="266" r:id="rId11"/>
+    <p:sldId id="263" r:id="rId6"/>
+    <p:sldId id="269" r:id="rId7"/>
+    <p:sldId id="264" r:id="rId8"/>
+    <p:sldId id="265" r:id="rId9"/>
+    <p:sldId id="266" r:id="rId10"/>
   </p:sldIdLst>
   <p:sldSz cx="12192000" cy="6858000"/>
   <p:notesSz cx="6858000" cy="9144000"/>
@@ -113,6 +112,11 @@
       </a:defRPr>
     </a:lvl9pPr>
   </p:defaultTextStyle>
+  <p:extLst>
+    <p:ext uri="{EFAFB233-063F-42B5-8137-9DF3F51BA10A}">
+      <p15:sldGuideLst xmlns:p15="http://schemas.microsoft.com/office/powerpoint/2012/main"/>
+    </p:ext>
+  </p:extLst>
 </p:presentation>
 </file>
 
@@ -1271,7 +1275,7 @@
           <a:p>
             <a:fld id="{965D8904-8BFC-4615-A3B1-F40E2BC38C0D}" type="datetimeFigureOut">
               <a:rPr lang="en-US" smtClean="0"/>
-              <a:t>11/10/2025</a:t>
+              <a:t>11/13/2025</a:t>
             </a:fld>
             <a:endParaRPr lang="en-US"/>
           </a:p>
@@ -1595,7 +1599,7 @@
           <a:p>
             <a:fld id="{965D8904-8BFC-4615-A3B1-F40E2BC38C0D}" type="datetimeFigureOut">
               <a:rPr lang="en-US" smtClean="0"/>
-              <a:t>11/10/2025</a:t>
+              <a:t>11/13/2025</a:t>
             </a:fld>
             <a:endParaRPr lang="en-US"/>
           </a:p>
@@ -1793,7 +1797,7 @@
           <a:p>
             <a:fld id="{965D8904-8BFC-4615-A3B1-F40E2BC38C0D}" type="datetimeFigureOut">
               <a:rPr lang="en-US" smtClean="0"/>
-              <a:t>11/10/2025</a:t>
+              <a:t>11/13/2025</a:t>
             </a:fld>
             <a:endParaRPr lang="en-US"/>
           </a:p>
@@ -2001,7 +2005,7 @@
           <a:p>
             <a:fld id="{965D8904-8BFC-4615-A3B1-F40E2BC38C0D}" type="datetimeFigureOut">
               <a:rPr lang="en-US" smtClean="0"/>
-              <a:t>11/10/2025</a:t>
+              <a:t>11/13/2025</a:t>
             </a:fld>
             <a:endParaRPr lang="en-US"/>
           </a:p>
@@ -2286,7 +2290,7 @@
           <a:p>
             <a:fld id="{965D8904-8BFC-4615-A3B1-F40E2BC38C0D}" type="datetimeFigureOut">
               <a:rPr lang="en-US" smtClean="0"/>
-              <a:t>11/10/2025</a:t>
+              <a:t>11/13/2025</a:t>
             </a:fld>
             <a:endParaRPr lang="en-US"/>
           </a:p>
@@ -2477,6 +2481,9 @@
           <a:bodyPr wrap="square"/>
           <a:lstStyle>
             <a:lvl1pPr>
+              <a:buClr>
+                <a:srgbClr val="EEB548"/>
+              </a:buClr>
               <a:buFont typeface="Wingdings" panose="05000000000000000000" pitchFamily="2" charset="2"/>
               <a:buChar char="§"/>
               <a:defRPr>
@@ -2484,6 +2491,9 @@
               </a:defRPr>
             </a:lvl1pPr>
             <a:lvl2pPr>
+              <a:buClr>
+                <a:srgbClr val="EEB548"/>
+              </a:buClr>
               <a:buFont typeface="Wingdings" panose="05000000000000000000" pitchFamily="2" charset="2"/>
               <a:buChar char="§"/>
               <a:defRPr>
@@ -2491,6 +2501,9 @@
               </a:defRPr>
             </a:lvl2pPr>
             <a:lvl3pPr>
+              <a:buClr>
+                <a:srgbClr val="EEB548"/>
+              </a:buClr>
               <a:buFont typeface="Wingdings" panose="05000000000000000000" pitchFamily="2" charset="2"/>
               <a:buChar char="§"/>
               <a:defRPr>
@@ -2498,6 +2511,9 @@
               </a:defRPr>
             </a:lvl3pPr>
             <a:lvl4pPr>
+              <a:buClr>
+                <a:srgbClr val="EEB548"/>
+              </a:buClr>
               <a:buFont typeface="Wingdings" panose="05000000000000000000" pitchFamily="2" charset="2"/>
               <a:buChar char="§"/>
               <a:defRPr>
@@ -2505,6 +2521,9 @@
               </a:defRPr>
             </a:lvl4pPr>
             <a:lvl5pPr>
+              <a:buClr>
+                <a:srgbClr val="EEB548"/>
+              </a:buClr>
               <a:buFont typeface="Wingdings" panose="05000000000000000000" pitchFamily="2" charset="2"/>
               <a:buChar char="§"/>
               <a:defRPr>
@@ -2572,7 +2591,7 @@
           <a:p>
             <a:fld id="{965D8904-8BFC-4615-A3B1-F40E2BC38C0D}" type="datetimeFigureOut">
               <a:rPr lang="en-US" smtClean="0"/>
-              <a:t>11/10/2025</a:t>
+              <a:t>11/13/2025</a:t>
             </a:fld>
             <a:endParaRPr lang="en-US"/>
           </a:p>
@@ -2632,42 +2651,6 @@
           </a:p>
         </p:txBody>
       </p:sp>
-      <p:pic>
-        <p:nvPicPr>
-          <p:cNvPr id="13" name="Picture 12" descr="A yellow star in a circle&#10;&#10;AI-generated content may be incorrect.">
-            <a:extLst>
-              <a:ext uri="{FF2B5EF4-FFF2-40B4-BE49-F238E27FC236}">
-                <a16:creationId xmlns:a16="http://schemas.microsoft.com/office/drawing/2014/main" id="{6F82EE5A-E43E-081E-A03D-B568D97BB41C}"/>
-              </a:ext>
-            </a:extLst>
-          </p:cNvPr>
-          <p:cNvPicPr>
-            <a:picLocks noChangeAspect="1"/>
-          </p:cNvPicPr>
-          <p:nvPr userDrawn="1"/>
-        </p:nvPicPr>
-        <p:blipFill>
-          <a:blip r:embed="rId2">
-            <a:extLst>
-              <a:ext uri="{28A0092B-C50C-407E-A947-70E740481C1C}">
-                <a14:useLocalDpi xmlns:a14="http://schemas.microsoft.com/office/drawing/2010/main" val="0"/>
-              </a:ext>
-            </a:extLst>
-          </a:blip>
-          <a:stretch>
-            <a:fillRect/>
-          </a:stretch>
-        </p:blipFill>
-        <p:spPr>
-          <a:xfrm>
-            <a:off x="11266500" y="115748"/>
-            <a:ext cx="893321" cy="893321"/>
-          </a:xfrm>
-          <a:prstGeom prst="rect">
-            <a:avLst/>
-          </a:prstGeom>
-        </p:spPr>
-      </p:pic>
       <p:sp>
         <p:nvSpPr>
           <p:cNvPr id="14" name="Rectangle 13">
@@ -2689,7 +2672,7 @@
             <a:avLst/>
           </a:prstGeom>
           <a:solidFill>
-            <a:srgbClr val="EEB548"/>
+            <a:schemeClr val="tx1"/>
           </a:solidFill>
           <a:ln>
             <a:noFill/>
@@ -2741,7 +2724,7 @@
             <a:avLst/>
           </a:prstGeom>
           <a:solidFill>
-            <a:srgbClr val="EEB548"/>
+            <a:schemeClr val="tx1"/>
           </a:solidFill>
           <a:ln>
             <a:noFill/>
@@ -2772,6 +2755,42 @@
           </a:p>
         </p:txBody>
       </p:sp>
+      <p:pic>
+        <p:nvPicPr>
+          <p:cNvPr id="8" name="Picture 7" descr="A white circle with a black background&#10;&#10;AI-generated content may be incorrect.">
+            <a:extLst>
+              <a:ext uri="{FF2B5EF4-FFF2-40B4-BE49-F238E27FC236}">
+                <a16:creationId xmlns:a16="http://schemas.microsoft.com/office/drawing/2014/main" id="{581CBAD8-F762-4352-7368-A017E3D18422}"/>
+              </a:ext>
+            </a:extLst>
+          </p:cNvPr>
+          <p:cNvPicPr>
+            <a:picLocks noChangeAspect="1"/>
+          </p:cNvPicPr>
+          <p:nvPr userDrawn="1"/>
+        </p:nvPicPr>
+        <p:blipFill>
+          <a:blip r:embed="rId2">
+            <a:extLst>
+              <a:ext uri="{28A0092B-C50C-407E-A947-70E740481C1C}">
+                <a14:useLocalDpi xmlns:a14="http://schemas.microsoft.com/office/drawing/2010/main" val="0"/>
+              </a:ext>
+            </a:extLst>
+          </a:blip>
+          <a:stretch>
+            <a:fillRect/>
+          </a:stretch>
+        </p:blipFill>
+        <p:spPr>
+          <a:xfrm>
+            <a:off x="11321992" y="114483"/>
+            <a:ext cx="838200" cy="838200"/>
+          </a:xfrm>
+          <a:prstGeom prst="rect">
+            <a:avLst/>
+          </a:prstGeom>
+        </p:spPr>
+      </p:pic>
     </p:spTree>
     <p:extLst>
       <p:ext uri="{BB962C8B-B14F-4D97-AF65-F5344CB8AC3E}">
@@ -2987,7 +3006,7 @@
           <a:p>
             <a:fld id="{965D8904-8BFC-4615-A3B1-F40E2BC38C0D}" type="datetimeFigureOut">
               <a:rPr lang="en-US" smtClean="0"/>
-              <a:t>11/10/2025</a:t>
+              <a:t>11/13/2025</a:t>
             </a:fld>
             <a:endParaRPr lang="en-US"/>
           </a:p>
@@ -3252,7 +3271,7 @@
           <a:p>
             <a:fld id="{965D8904-8BFC-4615-A3B1-F40E2BC38C0D}" type="datetimeFigureOut">
               <a:rPr lang="en-US" smtClean="0"/>
-              <a:t>11/10/2025</a:t>
+              <a:t>11/13/2025</a:t>
             </a:fld>
             <a:endParaRPr lang="en-US"/>
           </a:p>
@@ -3664,7 +3683,7 @@
           <a:p>
             <a:fld id="{965D8904-8BFC-4615-A3B1-F40E2BC38C0D}" type="datetimeFigureOut">
               <a:rPr lang="en-US" smtClean="0"/>
-              <a:t>11/10/2025</a:t>
+              <a:t>11/13/2025</a:t>
             </a:fld>
             <a:endParaRPr lang="en-US"/>
           </a:p>
@@ -3805,7 +3824,7 @@
           <a:p>
             <a:fld id="{965D8904-8BFC-4615-A3B1-F40E2BC38C0D}" type="datetimeFigureOut">
               <a:rPr lang="en-US" smtClean="0"/>
-              <a:t>11/10/2025</a:t>
+              <a:t>11/13/2025</a:t>
             </a:fld>
             <a:endParaRPr lang="en-US"/>
           </a:p>
@@ -3918,7 +3937,7 @@
           <a:p>
             <a:fld id="{965D8904-8BFC-4615-A3B1-F40E2BC38C0D}" type="datetimeFigureOut">
               <a:rPr lang="en-US" smtClean="0"/>
-              <a:t>11/10/2025</a:t>
+              <a:t>11/13/2025</a:t>
             </a:fld>
             <a:endParaRPr lang="en-US"/>
           </a:p>
@@ -4229,7 +4248,7 @@
           <a:p>
             <a:fld id="{965D8904-8BFC-4615-A3B1-F40E2BC38C0D}" type="datetimeFigureOut">
               <a:rPr lang="en-US" smtClean="0"/>
-              <a:t>11/10/2025</a:t>
+              <a:t>11/13/2025</a:t>
             </a:fld>
             <a:endParaRPr lang="en-US"/>
           </a:p>
@@ -4470,7 +4489,7 @@
           <a:p>
             <a:fld id="{965D8904-8BFC-4615-A3B1-F40E2BC38C0D}" type="datetimeFigureOut">
               <a:rPr lang="en-US" smtClean="0"/>
-              <a:t>11/10/2025</a:t>
+              <a:t>11/13/2025</a:t>
             </a:fld>
             <a:endParaRPr lang="en-US"/>
           </a:p>
@@ -4959,94 +4978,6 @@
 </p:sld>
 </file>
 
-<file path=ppt/slides/slide10.xml><?xml version="1.0" encoding="utf-8"?>
-<p:sld xmlns:a="http://schemas.openxmlformats.org/drawingml/2006/main" xmlns:r="http://schemas.openxmlformats.org/officeDocument/2006/relationships" xmlns:p="http://schemas.openxmlformats.org/presentationml/2006/main">
-  <p:cSld>
-    <p:spTree>
-      <p:nvGrpSpPr>
-        <p:cNvPr id="1" name=""/>
-        <p:cNvGrpSpPr/>
-        <p:nvPr/>
-      </p:nvGrpSpPr>
-      <p:grpSpPr>
-        <a:xfrm>
-          <a:off x="0" y="0"/>
-          <a:ext cx="0" cy="0"/>
-          <a:chOff x="0" y="0"/>
-          <a:chExt cx="0" cy="0"/>
-        </a:xfrm>
-      </p:grpSpPr>
-      <p:sp>
-        <p:nvSpPr>
-          <p:cNvPr id="2" name="Title 1">
-            <a:extLst>
-              <a:ext uri="{FF2B5EF4-FFF2-40B4-BE49-F238E27FC236}">
-                <a16:creationId xmlns:a16="http://schemas.microsoft.com/office/drawing/2014/main" id="{A14716A4-8E0D-2487-2E14-87AB2BD94A19}"/>
-              </a:ext>
-            </a:extLst>
-          </p:cNvPr>
-          <p:cNvSpPr>
-            <a:spLocks noGrp="1"/>
-          </p:cNvSpPr>
-          <p:nvPr>
-            <p:ph type="ctrTitle"/>
-          </p:nvPr>
-        </p:nvSpPr>
-        <p:spPr/>
-        <p:txBody>
-          <a:bodyPr/>
-          <a:lstStyle/>
-          <a:p>
-            <a:r>
-              <a:rPr lang="en-GB" dirty="0"/>
-              <a:t>Thank You for Listening</a:t>
-            </a:r>
-            <a:endParaRPr lang="en-US" dirty="0"/>
-          </a:p>
-        </p:txBody>
-      </p:sp>
-      <p:sp>
-        <p:nvSpPr>
-          <p:cNvPr id="3" name="Subtitle 2">
-            <a:extLst>
-              <a:ext uri="{FF2B5EF4-FFF2-40B4-BE49-F238E27FC236}">
-                <a16:creationId xmlns:a16="http://schemas.microsoft.com/office/drawing/2014/main" id="{75FBCDBE-EC15-A448-9336-780D200BB5BF}"/>
-              </a:ext>
-            </a:extLst>
-          </p:cNvPr>
-          <p:cNvSpPr>
-            <a:spLocks noGrp="1"/>
-          </p:cNvSpPr>
-          <p:nvPr>
-            <p:ph type="subTitle" idx="1"/>
-          </p:nvPr>
-        </p:nvSpPr>
-        <p:spPr/>
-        <p:txBody>
-          <a:bodyPr/>
-          <a:lstStyle/>
-          <a:p>
-            <a:r>
-              <a:rPr lang="en-GB" dirty="0"/>
-              <a:t>Questions?</a:t>
-            </a:r>
-            <a:endParaRPr lang="en-US" dirty="0"/>
-          </a:p>
-        </p:txBody>
-      </p:sp>
-    </p:spTree>
-    <p:extLst>
-      <p:ext uri="{BB962C8B-B14F-4D97-AF65-F5344CB8AC3E}">
-        <p14:creationId xmlns:p14="http://schemas.microsoft.com/office/powerpoint/2010/main" val="770585874"/>
-      </p:ext>
-    </p:extLst>
-  </p:cSld>
-  <p:clrMapOvr>
-    <a:masterClrMapping/>
-  </p:clrMapOvr>
-</p:sld>
-</file>
-
 <file path=ppt/slides/slide2.xml><?xml version="1.0" encoding="utf-8"?>
 <p:sld xmlns:a="http://schemas.openxmlformats.org/drawingml/2006/main" xmlns:r="http://schemas.openxmlformats.org/officeDocument/2006/relationships" xmlns:p="http://schemas.openxmlformats.org/presentationml/2006/main">
   <p:cSld>
@@ -5528,319 +5459,6 @@
 </file>
 
 <file path=ppt/slides/slide5.xml><?xml version="1.0" encoding="utf-8"?>
-<p:sld xmlns:a="http://schemas.openxmlformats.org/drawingml/2006/main" xmlns:r="http://schemas.openxmlformats.org/officeDocument/2006/relationships" xmlns:p="http://schemas.openxmlformats.org/presentationml/2006/main">
-  <p:cSld>
-    <p:spTree>
-      <p:nvGrpSpPr>
-        <p:cNvPr id="1" name="">
-          <a:extLst>
-            <a:ext uri="{FF2B5EF4-FFF2-40B4-BE49-F238E27FC236}">
-              <a16:creationId xmlns:a16="http://schemas.microsoft.com/office/drawing/2014/main" id="{4FA32EE1-71D3-5F35-0F1F-D53D9BEDC47E}"/>
-            </a:ext>
-          </a:extLst>
-        </p:cNvPr>
-        <p:cNvGrpSpPr/>
-        <p:nvPr/>
-      </p:nvGrpSpPr>
-      <p:grpSpPr>
-        <a:xfrm>
-          <a:off x="0" y="0"/>
-          <a:ext cx="0" cy="0"/>
-          <a:chOff x="0" y="0"/>
-          <a:chExt cx="0" cy="0"/>
-        </a:xfrm>
-      </p:grpSpPr>
-      <p:sp>
-        <p:nvSpPr>
-          <p:cNvPr id="3" name="Rectangle 2">
-            <a:extLst>
-              <a:ext uri="{FF2B5EF4-FFF2-40B4-BE49-F238E27FC236}">
-                <a16:creationId xmlns:a16="http://schemas.microsoft.com/office/drawing/2014/main" id="{ED3D246C-18E5-F40D-5E26-C438F30575D1}"/>
-              </a:ext>
-            </a:extLst>
-          </p:cNvPr>
-          <p:cNvSpPr/>
-          <p:nvPr/>
-        </p:nvSpPr>
-        <p:spPr>
-          <a:xfrm>
-            <a:off x="1346718" y="1175651"/>
-            <a:ext cx="4749272" cy="2402631"/>
-          </a:xfrm>
-          <a:prstGeom prst="rect">
-            <a:avLst/>
-          </a:prstGeom>
-          <a:solidFill>
-            <a:schemeClr val="accent6">
-              <a:lumMod val="20000"/>
-              <a:lumOff val="80000"/>
-            </a:schemeClr>
-          </a:solidFill>
-          <a:ln>
-            <a:noFill/>
-          </a:ln>
-        </p:spPr>
-        <p:style>
-          <a:lnRef idx="2">
-            <a:schemeClr val="accent1">
-              <a:shade val="15000"/>
-            </a:schemeClr>
-          </a:lnRef>
-          <a:fillRef idx="1">
-            <a:schemeClr val="accent1"/>
-          </a:fillRef>
-          <a:effectRef idx="0">
-            <a:schemeClr val="accent1"/>
-          </a:effectRef>
-          <a:fontRef idx="minor">
-            <a:schemeClr val="lt1"/>
-          </a:fontRef>
-        </p:style>
-        <p:txBody>
-          <a:bodyPr rtlCol="0" anchor="ctr"/>
-          <a:lstStyle/>
-          <a:p>
-            <a:pPr algn="ctr"/>
-            <a:endParaRPr lang="en-US"/>
-          </a:p>
-        </p:txBody>
-      </p:sp>
-      <p:sp>
-        <p:nvSpPr>
-          <p:cNvPr id="2" name="Title 1">
-            <a:extLst>
-              <a:ext uri="{FF2B5EF4-FFF2-40B4-BE49-F238E27FC236}">
-                <a16:creationId xmlns:a16="http://schemas.microsoft.com/office/drawing/2014/main" id="{1B40C3C8-D16B-D51B-58C6-0BABC9EEFB68}"/>
-              </a:ext>
-            </a:extLst>
-          </p:cNvPr>
-          <p:cNvSpPr>
-            <a:spLocks noGrp="1"/>
-          </p:cNvSpPr>
-          <p:nvPr>
-            <p:ph type="title"/>
-          </p:nvPr>
-        </p:nvSpPr>
-        <p:spPr/>
-        <p:txBody>
-          <a:bodyPr/>
-          <a:lstStyle/>
-          <a:p>
-            <a:r>
-              <a:rPr lang="en-GB" dirty="0"/>
-              <a:t>/</a:t>
-            </a:r>
-            <a:r>
-              <a:rPr lang="en-GB" dirty="0" err="1"/>
-              <a:t>Market_Research</a:t>
-            </a:r>
-            <a:endParaRPr lang="en-US" dirty="0"/>
-          </a:p>
-        </p:txBody>
-      </p:sp>
-      <p:grpSp>
-        <p:nvGrpSpPr>
-          <p:cNvPr id="12" name="Group 11">
-            <a:extLst>
-              <a:ext uri="{FF2B5EF4-FFF2-40B4-BE49-F238E27FC236}">
-                <a16:creationId xmlns:a16="http://schemas.microsoft.com/office/drawing/2014/main" id="{742E7BF6-A387-67FD-7F62-C502C6DD2F89}"/>
-              </a:ext>
-            </a:extLst>
-          </p:cNvPr>
-          <p:cNvGrpSpPr/>
-          <p:nvPr/>
-        </p:nvGrpSpPr>
-        <p:grpSpPr>
-          <a:xfrm>
-            <a:off x="1346718" y="1175651"/>
-            <a:ext cx="9498563" cy="4805266"/>
-            <a:chOff x="1346719" y="1026367"/>
-            <a:chExt cx="9498563" cy="4805266"/>
-          </a:xfrm>
-        </p:grpSpPr>
-        <p:cxnSp>
-          <p:nvCxnSpPr>
-            <p:cNvPr id="5" name="Straight Connector 4">
-              <a:extLst>
-                <a:ext uri="{FF2B5EF4-FFF2-40B4-BE49-F238E27FC236}">
-                  <a16:creationId xmlns:a16="http://schemas.microsoft.com/office/drawing/2014/main" id="{5A88F933-9E7C-9DBF-3ECE-42BF9A3EC731}"/>
-                </a:ext>
-              </a:extLst>
-            </p:cNvPr>
-            <p:cNvCxnSpPr>
-              <a:cxnSpLocks/>
-            </p:cNvCxnSpPr>
-            <p:nvPr/>
-          </p:nvCxnSpPr>
-          <p:spPr>
-            <a:xfrm>
-              <a:off x="6096000" y="1026367"/>
-              <a:ext cx="0" cy="4805266"/>
-            </a:xfrm>
-            <a:prstGeom prst="line">
-              <a:avLst/>
-            </a:prstGeom>
-            <a:ln w="28575">
-              <a:solidFill>
-                <a:schemeClr val="tx1"/>
-              </a:solidFill>
-            </a:ln>
-          </p:spPr>
-          <p:style>
-            <a:lnRef idx="2">
-              <a:schemeClr val="accent1"/>
-            </a:lnRef>
-            <a:fillRef idx="0">
-              <a:schemeClr val="accent1"/>
-            </a:fillRef>
-            <a:effectRef idx="1">
-              <a:schemeClr val="accent1"/>
-            </a:effectRef>
-            <a:fontRef idx="minor">
-              <a:schemeClr val="tx1"/>
-            </a:fontRef>
-          </p:style>
-        </p:cxnSp>
-        <p:cxnSp>
-          <p:nvCxnSpPr>
-            <p:cNvPr id="11" name="Straight Connector 10">
-              <a:extLst>
-                <a:ext uri="{FF2B5EF4-FFF2-40B4-BE49-F238E27FC236}">
-                  <a16:creationId xmlns:a16="http://schemas.microsoft.com/office/drawing/2014/main" id="{712941A0-CB26-CAAF-415E-86284B353C47}"/>
-                </a:ext>
-              </a:extLst>
-            </p:cNvPr>
-            <p:cNvCxnSpPr>
-              <a:cxnSpLocks/>
-            </p:cNvCxnSpPr>
-            <p:nvPr/>
-          </p:nvCxnSpPr>
-          <p:spPr>
-            <a:xfrm>
-              <a:off x="1346719" y="3429000"/>
-              <a:ext cx="9498563" cy="0"/>
-            </a:xfrm>
-            <a:prstGeom prst="line">
-              <a:avLst/>
-            </a:prstGeom>
-            <a:ln w="28575">
-              <a:solidFill>
-                <a:schemeClr val="tx1"/>
-              </a:solidFill>
-            </a:ln>
-          </p:spPr>
-          <p:style>
-            <a:lnRef idx="2">
-              <a:schemeClr val="accent1"/>
-            </a:lnRef>
-            <a:fillRef idx="0">
-              <a:schemeClr val="accent1"/>
-            </a:fillRef>
-            <a:effectRef idx="1">
-              <a:schemeClr val="accent1"/>
-            </a:effectRef>
-            <a:fontRef idx="minor">
-              <a:schemeClr val="tx1"/>
-            </a:fontRef>
-          </p:style>
-        </p:cxnSp>
-      </p:grpSp>
-      <p:sp>
-        <p:nvSpPr>
-          <p:cNvPr id="13" name="TextBox 12">
-            <a:extLst>
-              <a:ext uri="{FF2B5EF4-FFF2-40B4-BE49-F238E27FC236}">
-                <a16:creationId xmlns:a16="http://schemas.microsoft.com/office/drawing/2014/main" id="{E9ECD9CB-A082-6688-1C15-BCDB96EB0C7E}"/>
-              </a:ext>
-            </a:extLst>
-          </p:cNvPr>
-          <p:cNvSpPr txBox="1"/>
-          <p:nvPr/>
-        </p:nvSpPr>
-        <p:spPr>
-          <a:xfrm>
-            <a:off x="4313852" y="6178246"/>
-            <a:ext cx="3564294" cy="369332"/>
-          </a:xfrm>
-          <a:prstGeom prst="rect">
-            <a:avLst/>
-          </a:prstGeom>
-          <a:noFill/>
-        </p:spPr>
-        <p:txBody>
-          <a:bodyPr wrap="square" rtlCol="0">
-            <a:spAutoFit/>
-          </a:bodyPr>
-          <a:lstStyle/>
-          <a:p>
-            <a:pPr algn="ctr"/>
-            <a:r>
-              <a:rPr lang="en-GB" b="1" dirty="0">
-                <a:latin typeface="Arial Nova" panose="020B0504020202020204" pitchFamily="34" charset="0"/>
-              </a:rPr>
-              <a:t>Amortized cost / hour</a:t>
-            </a:r>
-            <a:endParaRPr lang="en-US" b="1" dirty="0">
-              <a:latin typeface="Arial Nova" panose="020B0504020202020204" pitchFamily="34" charset="0"/>
-            </a:endParaRPr>
-          </a:p>
-        </p:txBody>
-      </p:sp>
-      <p:sp>
-        <p:nvSpPr>
-          <p:cNvPr id="14" name="TextBox 13">
-            <a:extLst>
-              <a:ext uri="{FF2B5EF4-FFF2-40B4-BE49-F238E27FC236}">
-                <a16:creationId xmlns:a16="http://schemas.microsoft.com/office/drawing/2014/main" id="{8827EC5A-1791-2157-C39E-922E39A587CD}"/>
-              </a:ext>
-            </a:extLst>
-          </p:cNvPr>
-          <p:cNvSpPr txBox="1"/>
-          <p:nvPr/>
-        </p:nvSpPr>
-        <p:spPr>
-          <a:xfrm rot="16200000">
-            <a:off x="-937333" y="3393618"/>
-            <a:ext cx="3564294" cy="369332"/>
-          </a:xfrm>
-          <a:prstGeom prst="rect">
-            <a:avLst/>
-          </a:prstGeom>
-          <a:noFill/>
-        </p:spPr>
-        <p:txBody>
-          <a:bodyPr wrap="square" rtlCol="0">
-            <a:spAutoFit/>
-          </a:bodyPr>
-          <a:lstStyle/>
-          <a:p>
-            <a:pPr algn="ctr"/>
-            <a:r>
-              <a:rPr lang="en-GB" b="1" dirty="0">
-                <a:latin typeface="Arial Nova" panose="020B0504020202020204" pitchFamily="34" charset="0"/>
-              </a:rPr>
-              <a:t>Capability</a:t>
-            </a:r>
-            <a:endParaRPr lang="en-US" b="1" dirty="0">
-              <a:latin typeface="Arial Nova" panose="020B0504020202020204" pitchFamily="34" charset="0"/>
-            </a:endParaRPr>
-          </a:p>
-        </p:txBody>
-      </p:sp>
-    </p:spTree>
-    <p:extLst>
-      <p:ext uri="{BB962C8B-B14F-4D97-AF65-F5344CB8AC3E}">
-        <p14:creationId xmlns:p14="http://schemas.microsoft.com/office/powerpoint/2010/main" val="2837584108"/>
-      </p:ext>
-    </p:extLst>
-  </p:cSld>
-  <p:clrMapOvr>
-    <a:masterClrMapping/>
-  </p:clrMapOvr>
-</p:sld>
-</file>
-
-<file path=ppt/slides/slide6.xml><?xml version="1.0" encoding="utf-8"?>
 <p:sld xmlns:a="http://schemas.openxmlformats.org/drawingml/2006/main" xmlns:r="http://schemas.openxmlformats.org/officeDocument/2006/relationships" xmlns:p="http://schemas.openxmlformats.org/presentationml/2006/main">
   <p:cSld>
     <p:spTree>
@@ -6607,7 +6225,7 @@
 </p:sld>
 </file>
 
-<file path=ppt/slides/slide7.xml><?xml version="1.0" encoding="utf-8"?>
+<file path=ppt/slides/slide6.xml><?xml version="1.0" encoding="utf-8"?>
 <p:sld xmlns:a="http://schemas.openxmlformats.org/drawingml/2006/main" xmlns:r="http://schemas.openxmlformats.org/officeDocument/2006/relationships" xmlns:p="http://schemas.openxmlformats.org/presentationml/2006/main">
   <p:cSld>
     <p:spTree>
@@ -7263,6 +6881,96 @@
 </p:sld>
 </file>
 
+<file path=ppt/slides/slide7.xml><?xml version="1.0" encoding="utf-8"?>
+<p:sld xmlns:a="http://schemas.openxmlformats.org/drawingml/2006/main" xmlns:r="http://schemas.openxmlformats.org/officeDocument/2006/relationships" xmlns:p="http://schemas.openxmlformats.org/presentationml/2006/main">
+  <p:cSld>
+    <p:spTree>
+      <p:nvGrpSpPr>
+        <p:cNvPr id="1" name=""/>
+        <p:cNvGrpSpPr/>
+        <p:nvPr/>
+      </p:nvGrpSpPr>
+      <p:grpSpPr>
+        <a:xfrm>
+          <a:off x="0" y="0"/>
+          <a:ext cx="0" cy="0"/>
+          <a:chOff x="0" y="0"/>
+          <a:chExt cx="0" cy="0"/>
+        </a:xfrm>
+      </p:grpSpPr>
+      <p:sp>
+        <p:nvSpPr>
+          <p:cNvPr id="2" name="Title 1">
+            <a:extLst>
+              <a:ext uri="{FF2B5EF4-FFF2-40B4-BE49-F238E27FC236}">
+                <a16:creationId xmlns:a16="http://schemas.microsoft.com/office/drawing/2014/main" id="{C331BB08-137A-A69C-4BA2-9B1260E4113A}"/>
+              </a:ext>
+            </a:extLst>
+          </p:cNvPr>
+          <p:cNvSpPr>
+            <a:spLocks noGrp="1"/>
+          </p:cNvSpPr>
+          <p:nvPr>
+            <p:ph type="title"/>
+          </p:nvPr>
+        </p:nvSpPr>
+        <p:spPr/>
+        <p:txBody>
+          <a:bodyPr>
+            <a:normAutofit/>
+          </a:bodyPr>
+          <a:lstStyle/>
+          <a:p>
+            <a:r>
+              <a:rPr lang="en-GB" dirty="0"/>
+              <a:t>/</a:t>
+            </a:r>
+            <a:r>
+              <a:rPr lang="en-GB" dirty="0" err="1"/>
+              <a:t>System_Overview</a:t>
+            </a:r>
+            <a:endParaRPr lang="en-US" dirty="0"/>
+          </a:p>
+        </p:txBody>
+      </p:sp>
+      <p:sp>
+        <p:nvSpPr>
+          <p:cNvPr id="3" name="Content Placeholder 2">
+            <a:extLst>
+              <a:ext uri="{FF2B5EF4-FFF2-40B4-BE49-F238E27FC236}">
+                <a16:creationId xmlns:a16="http://schemas.microsoft.com/office/drawing/2014/main" id="{3F7B708C-6D1F-5BFA-676E-E7A622AF7E40}"/>
+              </a:ext>
+            </a:extLst>
+          </p:cNvPr>
+          <p:cNvSpPr>
+            <a:spLocks noGrp="1"/>
+          </p:cNvSpPr>
+          <p:nvPr>
+            <p:ph idx="1"/>
+          </p:nvPr>
+        </p:nvSpPr>
+        <p:spPr/>
+        <p:txBody>
+          <a:bodyPr/>
+          <a:lstStyle/>
+          <a:p>
+            <a:endParaRPr lang="en-US"/>
+          </a:p>
+        </p:txBody>
+      </p:sp>
+    </p:spTree>
+    <p:extLst>
+      <p:ext uri="{BB962C8B-B14F-4D97-AF65-F5344CB8AC3E}">
+        <p14:creationId xmlns:p14="http://schemas.microsoft.com/office/powerpoint/2010/main" val="1577030535"/>
+      </p:ext>
+    </p:extLst>
+  </p:cSld>
+  <p:clrMapOvr>
+    <a:masterClrMapping/>
+  </p:clrMapOvr>
+</p:sld>
+</file>
+
 <file path=ppt/slides/slide8.xml><?xml version="1.0" encoding="utf-8"?>
 <p:sld xmlns:a="http://schemas.openxmlformats.org/drawingml/2006/main" xmlns:r="http://schemas.openxmlformats.org/officeDocument/2006/relationships" xmlns:p="http://schemas.openxmlformats.org/presentationml/2006/main">
   <p:cSld>
@@ -7285,7 +6993,7 @@
           <p:cNvPr id="2" name="Title 1">
             <a:extLst>
               <a:ext uri="{FF2B5EF4-FFF2-40B4-BE49-F238E27FC236}">
-                <a16:creationId xmlns:a16="http://schemas.microsoft.com/office/drawing/2014/main" id="{C331BB08-137A-A69C-4BA2-9B1260E4113A}"/>
+                <a16:creationId xmlns:a16="http://schemas.microsoft.com/office/drawing/2014/main" id="{21F2F04C-5823-D25F-EE48-9C5F2D46753D}"/>
               </a:ext>
             </a:extLst>
           </p:cNvPr>
@@ -7298,9 +7006,7 @@
         </p:nvSpPr>
         <p:spPr/>
         <p:txBody>
-          <a:bodyPr>
-            <a:normAutofit/>
-          </a:bodyPr>
+          <a:bodyPr/>
           <a:lstStyle/>
           <a:p>
             <a:r>
@@ -7309,7 +7015,7 @@
             </a:r>
             <a:r>
               <a:rPr lang="en-GB" dirty="0" err="1"/>
-              <a:t>System_Overview</a:t>
+              <a:t>Technical_Contributions</a:t>
             </a:r>
             <a:endParaRPr lang="en-US" dirty="0"/>
           </a:p>
@@ -7320,7 +7026,7 @@
           <p:cNvPr id="3" name="Content Placeholder 2">
             <a:extLst>
               <a:ext uri="{FF2B5EF4-FFF2-40B4-BE49-F238E27FC236}">
-                <a16:creationId xmlns:a16="http://schemas.microsoft.com/office/drawing/2014/main" id="{3F7B708C-6D1F-5BFA-676E-E7A622AF7E40}"/>
+                <a16:creationId xmlns:a16="http://schemas.microsoft.com/office/drawing/2014/main" id="{5A162E20-C12D-9EAE-E552-DDE45887806A}"/>
               </a:ext>
             </a:extLst>
           </p:cNvPr>
@@ -7343,7 +7049,7 @@
     </p:spTree>
     <p:extLst>
       <p:ext uri="{BB962C8B-B14F-4D97-AF65-F5344CB8AC3E}">
-        <p14:creationId xmlns:p14="http://schemas.microsoft.com/office/powerpoint/2010/main" val="1577030535"/>
+        <p14:creationId xmlns:p14="http://schemas.microsoft.com/office/powerpoint/2010/main" val="3812229581"/>
       </p:ext>
     </p:extLst>
   </p:cSld>
@@ -7375,15 +7081,15 @@
           <p:cNvPr id="2" name="Title 1">
             <a:extLst>
               <a:ext uri="{FF2B5EF4-FFF2-40B4-BE49-F238E27FC236}">
-                <a16:creationId xmlns:a16="http://schemas.microsoft.com/office/drawing/2014/main" id="{21F2F04C-5823-D25F-EE48-9C5F2D46753D}"/>
-              </a:ext>
-            </a:extLst>
-          </p:cNvPr>
-          <p:cNvSpPr>
-            <a:spLocks noGrp="1"/>
-          </p:cNvSpPr>
-          <p:nvPr>
-            <p:ph type="title"/>
+                <a16:creationId xmlns:a16="http://schemas.microsoft.com/office/drawing/2014/main" id="{A14716A4-8E0D-2487-2E14-87AB2BD94A19}"/>
+              </a:ext>
+            </a:extLst>
+          </p:cNvPr>
+          <p:cNvSpPr>
+            <a:spLocks noGrp="1"/>
+          </p:cNvSpPr>
+          <p:nvPr>
+            <p:ph type="ctrTitle"/>
           </p:nvPr>
         </p:nvSpPr>
         <p:spPr/>
@@ -7393,11 +7099,7 @@
           <a:p>
             <a:r>
               <a:rPr lang="en-GB" dirty="0"/>
-              <a:t>/</a:t>
-            </a:r>
-            <a:r>
-              <a:rPr lang="en-GB" dirty="0" err="1"/>
-              <a:t>Technical_Contributions</a:t>
+              <a:t>Thank You for Listening</a:t>
             </a:r>
             <a:endParaRPr lang="en-US" dirty="0"/>
           </a:p>
@@ -7405,18 +7107,18 @@
       </p:sp>
       <p:sp>
         <p:nvSpPr>
-          <p:cNvPr id="3" name="Content Placeholder 2">
-            <a:extLst>
-              <a:ext uri="{FF2B5EF4-FFF2-40B4-BE49-F238E27FC236}">
-                <a16:creationId xmlns:a16="http://schemas.microsoft.com/office/drawing/2014/main" id="{5A162E20-C12D-9EAE-E552-DDE45887806A}"/>
-              </a:ext>
-            </a:extLst>
-          </p:cNvPr>
-          <p:cNvSpPr>
-            <a:spLocks noGrp="1"/>
-          </p:cNvSpPr>
-          <p:nvPr>
-            <p:ph idx="1"/>
+          <p:cNvPr id="3" name="Subtitle 2">
+            <a:extLst>
+              <a:ext uri="{FF2B5EF4-FFF2-40B4-BE49-F238E27FC236}">
+                <a16:creationId xmlns:a16="http://schemas.microsoft.com/office/drawing/2014/main" id="{75FBCDBE-EC15-A448-9336-780D200BB5BF}"/>
+              </a:ext>
+            </a:extLst>
+          </p:cNvPr>
+          <p:cNvSpPr>
+            <a:spLocks noGrp="1"/>
+          </p:cNvSpPr>
+          <p:nvPr>
+            <p:ph type="subTitle" idx="1"/>
           </p:nvPr>
         </p:nvSpPr>
         <p:spPr/>
@@ -7424,14 +7126,18 @@
           <a:bodyPr/>
           <a:lstStyle/>
           <a:p>
-            <a:endParaRPr lang="en-US"/>
+            <a:r>
+              <a:rPr lang="en-GB" dirty="0"/>
+              <a:t>Questions?</a:t>
+            </a:r>
+            <a:endParaRPr lang="en-US" dirty="0"/>
           </a:p>
         </p:txBody>
       </p:sp>
     </p:spTree>
     <p:extLst>
       <p:ext uri="{BB962C8B-B14F-4D97-AF65-F5344CB8AC3E}">
-        <p14:creationId xmlns:p14="http://schemas.microsoft.com/office/powerpoint/2010/main" val="3812229581"/>
+        <p14:creationId xmlns:p14="http://schemas.microsoft.com/office/powerpoint/2010/main" val="770585874"/>
       </p:ext>
     </p:extLst>
   </p:cSld>

</xml_diff>

<commit_message>
more additions to report
</commit_message>
<xml_diff>
--- a/Report_Presentation/Presentation.pptx
+++ b/Report_Presentation/Presentation.pptx
@@ -10,10 +10,9 @@
     <p:sldId id="267" r:id="rId4"/>
     <p:sldId id="257" r:id="rId5"/>
     <p:sldId id="263" r:id="rId6"/>
-    <p:sldId id="269" r:id="rId7"/>
-    <p:sldId id="264" r:id="rId8"/>
-    <p:sldId id="265" r:id="rId9"/>
-    <p:sldId id="266" r:id="rId10"/>
+    <p:sldId id="264" r:id="rId7"/>
+    <p:sldId id="265" r:id="rId8"/>
+    <p:sldId id="266" r:id="rId9"/>
   </p:sldIdLst>
   <p:sldSz cx="12192000" cy="6858000"/>
   <p:notesSz cx="6858000" cy="9144000"/>
@@ -1275,7 +1274,7 @@
           <a:p>
             <a:fld id="{965D8904-8BFC-4615-A3B1-F40E2BC38C0D}" type="datetimeFigureOut">
               <a:rPr lang="en-US" smtClean="0"/>
-              <a:t>11/13/2025</a:t>
+              <a:t>11/14/2025</a:t>
             </a:fld>
             <a:endParaRPr lang="en-US"/>
           </a:p>
@@ -1599,7 +1598,7 @@
           <a:p>
             <a:fld id="{965D8904-8BFC-4615-A3B1-F40E2BC38C0D}" type="datetimeFigureOut">
               <a:rPr lang="en-US" smtClean="0"/>
-              <a:t>11/13/2025</a:t>
+              <a:t>11/14/2025</a:t>
             </a:fld>
             <a:endParaRPr lang="en-US"/>
           </a:p>
@@ -1797,7 +1796,7 @@
           <a:p>
             <a:fld id="{965D8904-8BFC-4615-A3B1-F40E2BC38C0D}" type="datetimeFigureOut">
               <a:rPr lang="en-US" smtClean="0"/>
-              <a:t>11/13/2025</a:t>
+              <a:t>11/14/2025</a:t>
             </a:fld>
             <a:endParaRPr lang="en-US"/>
           </a:p>
@@ -2005,7 +2004,7 @@
           <a:p>
             <a:fld id="{965D8904-8BFC-4615-A3B1-F40E2BC38C0D}" type="datetimeFigureOut">
               <a:rPr lang="en-US" smtClean="0"/>
-              <a:t>11/13/2025</a:t>
+              <a:t>11/14/2025</a:t>
             </a:fld>
             <a:endParaRPr lang="en-US"/>
           </a:p>
@@ -2290,7 +2289,7 @@
           <a:p>
             <a:fld id="{965D8904-8BFC-4615-A3B1-F40E2BC38C0D}" type="datetimeFigureOut">
               <a:rPr lang="en-US" smtClean="0"/>
-              <a:t>11/13/2025</a:t>
+              <a:t>11/14/2025</a:t>
             </a:fld>
             <a:endParaRPr lang="en-US"/>
           </a:p>
@@ -2591,7 +2590,7 @@
           <a:p>
             <a:fld id="{965D8904-8BFC-4615-A3B1-F40E2BC38C0D}" type="datetimeFigureOut">
               <a:rPr lang="en-US" smtClean="0"/>
-              <a:t>11/13/2025</a:t>
+              <a:t>11/14/2025</a:t>
             </a:fld>
             <a:endParaRPr lang="en-US"/>
           </a:p>
@@ -3006,7 +3005,7 @@
           <a:p>
             <a:fld id="{965D8904-8BFC-4615-A3B1-F40E2BC38C0D}" type="datetimeFigureOut">
               <a:rPr lang="en-US" smtClean="0"/>
-              <a:t>11/13/2025</a:t>
+              <a:t>11/14/2025</a:t>
             </a:fld>
             <a:endParaRPr lang="en-US"/>
           </a:p>
@@ -3271,7 +3270,7 @@
           <a:p>
             <a:fld id="{965D8904-8BFC-4615-A3B1-F40E2BC38C0D}" type="datetimeFigureOut">
               <a:rPr lang="en-US" smtClean="0"/>
-              <a:t>11/13/2025</a:t>
+              <a:t>11/14/2025</a:t>
             </a:fld>
             <a:endParaRPr lang="en-US"/>
           </a:p>
@@ -3683,7 +3682,7 @@
           <a:p>
             <a:fld id="{965D8904-8BFC-4615-A3B1-F40E2BC38C0D}" type="datetimeFigureOut">
               <a:rPr lang="en-US" smtClean="0"/>
-              <a:t>11/13/2025</a:t>
+              <a:t>11/14/2025</a:t>
             </a:fld>
             <a:endParaRPr lang="en-US"/>
           </a:p>
@@ -3824,7 +3823,7 @@
           <a:p>
             <a:fld id="{965D8904-8BFC-4615-A3B1-F40E2BC38C0D}" type="datetimeFigureOut">
               <a:rPr lang="en-US" smtClean="0"/>
-              <a:t>11/13/2025</a:t>
+              <a:t>11/14/2025</a:t>
             </a:fld>
             <a:endParaRPr lang="en-US"/>
           </a:p>
@@ -3937,7 +3936,7 @@
           <a:p>
             <a:fld id="{965D8904-8BFC-4615-A3B1-F40E2BC38C0D}" type="datetimeFigureOut">
               <a:rPr lang="en-US" smtClean="0"/>
-              <a:t>11/13/2025</a:t>
+              <a:t>11/14/2025</a:t>
             </a:fld>
             <a:endParaRPr lang="en-US"/>
           </a:p>
@@ -4248,7 +4247,7 @@
           <a:p>
             <a:fld id="{965D8904-8BFC-4615-A3B1-F40E2BC38C0D}" type="datetimeFigureOut">
               <a:rPr lang="en-US" smtClean="0"/>
-              <a:t>11/13/2025</a:t>
+              <a:t>11/14/2025</a:t>
             </a:fld>
             <a:endParaRPr lang="en-US"/>
           </a:p>
@@ -4489,7 +4488,7 @@
           <a:p>
             <a:fld id="{965D8904-8BFC-4615-A3B1-F40E2BC38C0D}" type="datetimeFigureOut">
               <a:rPr lang="en-US" smtClean="0"/>
-              <a:t>11/13/2025</a:t>
+              <a:t>11/14/2025</a:t>
             </a:fld>
             <a:endParaRPr lang="en-US"/>
           </a:p>
@@ -5055,7 +5054,7 @@
           <a:p>
             <a:r>
               <a:rPr lang="en-GB" dirty="0"/>
-              <a:t>/Members</a:t>
+              <a:t>/Team</a:t>
             </a:r>
           </a:p>
           <a:p>
@@ -5158,7 +5157,7 @@
           <a:p>
             <a:r>
               <a:rPr lang="en-GB" dirty="0"/>
-              <a:t>/Members</a:t>
+              <a:t>/Team</a:t>
             </a:r>
             <a:endParaRPr lang="en-US" dirty="0"/>
           </a:p>
@@ -5187,46 +5186,26 @@
           <a:p>
             <a:r>
               <a:rPr lang="en-GB" dirty="0"/>
-              <a:t>/</a:t>
-            </a:r>
-            <a:r>
-              <a:rPr lang="en-GB" dirty="0" err="1"/>
-              <a:t>Gidon_Gautel</a:t>
-            </a:r>
-            <a:endParaRPr lang="en-GB" dirty="0"/>
+              <a:t>Gidon Gautel</a:t>
+            </a:r>
           </a:p>
           <a:p>
             <a:r>
               <a:rPr lang="en-GB" dirty="0"/>
-              <a:t>/</a:t>
-            </a:r>
-            <a:r>
-              <a:rPr lang="en-GB" dirty="0" err="1"/>
-              <a:t>Skanda_Nadig</a:t>
-            </a:r>
-            <a:endParaRPr lang="en-GB" dirty="0"/>
+              <a:t>Skanda Nadig</a:t>
+            </a:r>
           </a:p>
           <a:p>
             <a:r>
               <a:rPr lang="en-GB" dirty="0"/>
-              <a:t>/</a:t>
-            </a:r>
-            <a:r>
-              <a:rPr lang="en-GB" dirty="0" err="1"/>
-              <a:t>Yunhao_Cao</a:t>
-            </a:r>
-            <a:endParaRPr lang="en-GB" dirty="0"/>
+              <a:t>Yunhao Cao</a:t>
+            </a:r>
           </a:p>
           <a:p>
             <a:r>
               <a:rPr lang="en-GB" dirty="0"/>
-              <a:t>/</a:t>
-            </a:r>
-            <a:r>
-              <a:rPr lang="en-GB" dirty="0" err="1"/>
-              <a:t>Gourav_Mohanan</a:t>
-            </a:r>
-            <a:endParaRPr lang="en-GB" dirty="0"/>
+              <a:t>Gourav Mohanan</a:t>
+            </a:r>
           </a:p>
         </p:txBody>
       </p:sp>
@@ -5283,7 +5262,7 @@
           <a:p>
             <a:r>
               <a:rPr lang="en-GB" dirty="0"/>
-              <a:t>/Motivation</a:t>
+              <a:t>Motivation</a:t>
             </a:r>
             <a:endParaRPr lang="en-US" dirty="0"/>
           </a:p>
@@ -5553,15 +5532,7 @@
           <a:p>
             <a:r>
               <a:rPr lang="en-GB" dirty="0"/>
-              <a:t>/</a:t>
-            </a:r>
-            <a:r>
-              <a:rPr lang="en-GB" dirty="0" err="1"/>
-              <a:t>Market_Research</a:t>
-            </a:r>
-            <a:r>
-              <a:rPr lang="en-GB" dirty="0"/>
-              <a:t>: Active Programs</a:t>
+              <a:t>Market Research</a:t>
             </a:r>
             <a:endParaRPr lang="en-US" dirty="0"/>
           </a:p>
@@ -5770,7 +5741,7 @@
         </p:nvGrpSpPr>
         <p:grpSpPr>
           <a:xfrm>
-            <a:off x="9537290" y="911510"/>
+            <a:off x="9537290" y="1166314"/>
             <a:ext cx="1307991" cy="866103"/>
             <a:chOff x="7921972" y="458842"/>
             <a:chExt cx="1527111" cy="1011196"/>
@@ -5981,237 +5952,114 @@
           </p:spPr>
         </p:pic>
       </p:grpSp>
-      <p:grpSp>
-        <p:nvGrpSpPr>
-          <p:cNvPr id="37" name="Group 36">
-            <a:extLst>
-              <a:ext uri="{FF2B5EF4-FFF2-40B4-BE49-F238E27FC236}">
-                <a16:creationId xmlns:a16="http://schemas.microsoft.com/office/drawing/2014/main" id="{3C3E4726-1899-40E9-4565-3C4BF0285E2B}"/>
-              </a:ext>
-            </a:extLst>
-          </p:cNvPr>
-          <p:cNvGrpSpPr/>
+      <p:pic>
+        <p:nvPicPr>
+          <p:cNvPr id="32" name="Picture 31" descr="A yellow star in a circle&#10;&#10;AI-generated content may be incorrect.">
+            <a:extLst>
+              <a:ext uri="{FF2B5EF4-FFF2-40B4-BE49-F238E27FC236}">
+                <a16:creationId xmlns:a16="http://schemas.microsoft.com/office/drawing/2014/main" id="{5674B010-CDE8-CD28-72B2-D4077EFFE90C}"/>
+              </a:ext>
+            </a:extLst>
+          </p:cNvPr>
+          <p:cNvPicPr>
+            <a:picLocks noChangeAspect="1"/>
+          </p:cNvPicPr>
           <p:nvPr/>
-        </p:nvGrpSpPr>
-        <p:grpSpPr>
+        </p:nvPicPr>
+        <p:blipFill>
+          <a:blip r:embed="rId7">
+            <a:extLst>
+              <a:ext uri="{28A0092B-C50C-407E-A947-70E740481C1C}">
+                <a14:useLocalDpi xmlns:a14="http://schemas.microsoft.com/office/drawing/2010/main" val="0"/>
+              </a:ext>
+            </a:extLst>
+          </a:blip>
+          <a:stretch>
+            <a:fillRect/>
+          </a:stretch>
+        </p:blipFill>
+        <p:spPr>
           <a:xfrm>
-            <a:off x="1427048" y="2046217"/>
-            <a:ext cx="1111898" cy="2088016"/>
-            <a:chOff x="2059347" y="2046217"/>
-            <a:chExt cx="1111898" cy="2088016"/>
+            <a:off x="1477494" y="2276203"/>
+            <a:ext cx="1111898" cy="1111898"/>
           </a:xfrm>
-        </p:grpSpPr>
-        <p:pic>
-          <p:nvPicPr>
-            <p:cNvPr id="32" name="Picture 31" descr="A yellow star in a circle&#10;&#10;AI-generated content may be incorrect.">
-              <a:extLst>
-                <a:ext uri="{FF2B5EF4-FFF2-40B4-BE49-F238E27FC236}">
-                  <a16:creationId xmlns:a16="http://schemas.microsoft.com/office/drawing/2014/main" id="{5674B010-CDE8-CD28-72B2-D4077EFFE90C}"/>
-                </a:ext>
-              </a:extLst>
-            </p:cNvPr>
-            <p:cNvPicPr>
-              <a:picLocks noChangeAspect="1"/>
-            </p:cNvPicPr>
-            <p:nvPr/>
-          </p:nvPicPr>
-          <p:blipFill>
-            <a:blip r:embed="rId7">
-              <a:extLst>
-                <a:ext uri="{28A0092B-C50C-407E-A947-70E740481C1C}">
-                  <a14:useLocalDpi xmlns:a14="http://schemas.microsoft.com/office/drawing/2010/main" val="0"/>
-                </a:ext>
-              </a:extLst>
-            </a:blip>
-            <a:stretch>
-              <a:fillRect/>
-            </a:stretch>
-          </p:blipFill>
-          <p:spPr>
-            <a:xfrm>
-              <a:off x="2059347" y="3022335"/>
-              <a:ext cx="1111898" cy="1111898"/>
-            </a:xfrm>
-            <a:prstGeom prst="rect">
-              <a:avLst/>
-            </a:prstGeom>
-          </p:spPr>
-        </p:pic>
-        <p:sp>
-          <p:nvSpPr>
-            <p:cNvPr id="33" name="Arrow: Chevron 32">
-              <a:extLst>
-                <a:ext uri="{FF2B5EF4-FFF2-40B4-BE49-F238E27FC236}">
-                  <a16:creationId xmlns:a16="http://schemas.microsoft.com/office/drawing/2014/main" id="{88913B10-2CB4-D812-9154-7714D0133435}"/>
-                </a:ext>
-              </a:extLst>
-            </p:cNvPr>
-            <p:cNvSpPr/>
-            <p:nvPr/>
-          </p:nvSpPr>
-          <p:spPr>
-            <a:xfrm rot="16200000">
-              <a:off x="2430631" y="2429455"/>
-              <a:ext cx="369331" cy="653142"/>
-            </a:xfrm>
-            <a:prstGeom prst="chevron">
-              <a:avLst/>
-            </a:prstGeom>
-            <a:solidFill>
-              <a:srgbClr val="EEB548">
-                <a:alpha val="63000"/>
-              </a:srgbClr>
-            </a:solidFill>
-            <a:ln>
-              <a:noFill/>
-            </a:ln>
-          </p:spPr>
-          <p:style>
-            <a:lnRef idx="2">
-              <a:schemeClr val="accent1">
-                <a:shade val="15000"/>
-              </a:schemeClr>
-            </a:lnRef>
-            <a:fillRef idx="1">
-              <a:schemeClr val="accent1"/>
-            </a:fillRef>
-            <a:effectRef idx="0">
-              <a:schemeClr val="accent1"/>
-            </a:effectRef>
-            <a:fontRef idx="minor">
-              <a:schemeClr val="lt1"/>
-            </a:fontRef>
-          </p:style>
-          <p:txBody>
-            <a:bodyPr rtlCol="0" anchor="ctr"/>
-            <a:lstStyle/>
-            <a:p>
-              <a:pPr algn="ctr"/>
-              <a:endParaRPr lang="en-US">
-                <a:solidFill>
-                  <a:schemeClr val="tx1"/>
-                </a:solidFill>
-              </a:endParaRPr>
-            </a:p>
-          </p:txBody>
-        </p:sp>
-        <p:sp>
-          <p:nvSpPr>
-            <p:cNvPr id="34" name="Arrow: Chevron 33">
-              <a:extLst>
-                <a:ext uri="{FF2B5EF4-FFF2-40B4-BE49-F238E27FC236}">
-                  <a16:creationId xmlns:a16="http://schemas.microsoft.com/office/drawing/2014/main" id="{013438AF-F95E-8903-2722-EC10F1328355}"/>
-                </a:ext>
-              </a:extLst>
-            </p:cNvPr>
-            <p:cNvSpPr/>
-            <p:nvPr/>
-          </p:nvSpPr>
-          <p:spPr>
-            <a:xfrm rot="16200000">
-              <a:off x="2449343" y="2158136"/>
-              <a:ext cx="331906" cy="586958"/>
-            </a:xfrm>
-            <a:prstGeom prst="chevron">
-              <a:avLst/>
-            </a:prstGeom>
-            <a:solidFill>
-              <a:srgbClr val="EEB548">
-                <a:alpha val="36000"/>
-              </a:srgbClr>
-            </a:solidFill>
-            <a:ln>
-              <a:noFill/>
-            </a:ln>
-          </p:spPr>
-          <p:style>
-            <a:lnRef idx="2">
-              <a:schemeClr val="accent1">
-                <a:shade val="15000"/>
-              </a:schemeClr>
-            </a:lnRef>
-            <a:fillRef idx="1">
-              <a:schemeClr val="accent1"/>
-            </a:fillRef>
-            <a:effectRef idx="0">
-              <a:schemeClr val="accent1"/>
-            </a:effectRef>
-            <a:fontRef idx="minor">
-              <a:schemeClr val="lt1"/>
-            </a:fontRef>
-          </p:style>
-          <p:txBody>
-            <a:bodyPr rtlCol="0" anchor="ctr"/>
-            <a:lstStyle/>
-            <a:p>
-              <a:pPr algn="ctr"/>
-              <a:endParaRPr lang="en-US">
-                <a:solidFill>
-                  <a:schemeClr val="tx1"/>
-                </a:solidFill>
-              </a:endParaRPr>
-            </a:p>
-          </p:txBody>
-        </p:sp>
-        <p:sp>
-          <p:nvSpPr>
-            <p:cNvPr id="35" name="Arrow: Chevron 34">
-              <a:extLst>
-                <a:ext uri="{FF2B5EF4-FFF2-40B4-BE49-F238E27FC236}">
-                  <a16:creationId xmlns:a16="http://schemas.microsoft.com/office/drawing/2014/main" id="{4C19E779-4CF3-98D3-531A-1212772FF5B4}"/>
-                </a:ext>
-              </a:extLst>
-            </p:cNvPr>
-            <p:cNvSpPr/>
-            <p:nvPr/>
-          </p:nvSpPr>
-          <p:spPr>
-            <a:xfrm rot="16200000">
-              <a:off x="2472072" y="1936157"/>
-              <a:ext cx="286449" cy="506570"/>
-            </a:xfrm>
-            <a:prstGeom prst="chevron">
-              <a:avLst/>
-            </a:prstGeom>
-            <a:solidFill>
-              <a:srgbClr val="EEB548">
-                <a:alpha val="23000"/>
-              </a:srgbClr>
-            </a:solidFill>
-            <a:ln>
-              <a:noFill/>
-            </a:ln>
-          </p:spPr>
-          <p:style>
-            <a:lnRef idx="2">
-              <a:schemeClr val="accent1">
-                <a:shade val="15000"/>
-              </a:schemeClr>
-            </a:lnRef>
-            <a:fillRef idx="1">
-              <a:schemeClr val="accent1"/>
-            </a:fillRef>
-            <a:effectRef idx="0">
-              <a:schemeClr val="accent1"/>
-            </a:effectRef>
-            <a:fontRef idx="minor">
-              <a:schemeClr val="lt1"/>
-            </a:fontRef>
-          </p:style>
-          <p:txBody>
-            <a:bodyPr rtlCol="0" anchor="ctr"/>
-            <a:lstStyle/>
-            <a:p>
-              <a:pPr algn="ctr"/>
-              <a:endParaRPr lang="en-US">
-                <a:solidFill>
-                  <a:schemeClr val="tx1"/>
-                </a:solidFill>
-              </a:endParaRPr>
-            </a:p>
-          </p:txBody>
-        </p:sp>
-      </p:grpSp>
+          <a:prstGeom prst="rect">
+            <a:avLst/>
+          </a:prstGeom>
+        </p:spPr>
+      </p:pic>
+      <p:pic>
+        <p:nvPicPr>
+          <p:cNvPr id="3" name="Picture 2" descr="A black and white logo&#10;&#10;AI-generated content may be incorrect.">
+            <a:extLst>
+              <a:ext uri="{FF2B5EF4-FFF2-40B4-BE49-F238E27FC236}">
+                <a16:creationId xmlns:a16="http://schemas.microsoft.com/office/drawing/2014/main" id="{E41DABFC-2C71-B195-A28B-99DF24E0D4AB}"/>
+              </a:ext>
+            </a:extLst>
+          </p:cNvPr>
+          <p:cNvPicPr>
+            <a:picLocks noChangeAspect="1"/>
+          </p:cNvPicPr>
+          <p:nvPr/>
+        </p:nvPicPr>
+        <p:blipFill>
+          <a:blip r:embed="rId8">
+            <a:extLst>
+              <a:ext uri="{28A0092B-C50C-407E-A947-70E740481C1C}">
+                <a14:useLocalDpi xmlns:a14="http://schemas.microsoft.com/office/drawing/2010/main" val="0"/>
+              </a:ext>
+            </a:extLst>
+          </a:blip>
+          <a:stretch>
+            <a:fillRect/>
+          </a:stretch>
+        </p:blipFill>
+        <p:spPr>
+          <a:xfrm>
+            <a:off x="4850086" y="3119085"/>
+            <a:ext cx="1286197" cy="829103"/>
+          </a:xfrm>
+          <a:prstGeom prst="rect">
+            <a:avLst/>
+          </a:prstGeom>
+        </p:spPr>
+      </p:pic>
+      <p:pic>
+        <p:nvPicPr>
+          <p:cNvPr id="4" name="Picture 3" descr="A blue and black logo&#10;&#10;AI-generated content may be incorrect.">
+            <a:extLst>
+              <a:ext uri="{FF2B5EF4-FFF2-40B4-BE49-F238E27FC236}">
+                <a16:creationId xmlns:a16="http://schemas.microsoft.com/office/drawing/2014/main" id="{FF9021E6-3D41-3ADA-C35C-986EE54E3705}"/>
+              </a:ext>
+            </a:extLst>
+          </p:cNvPr>
+          <p:cNvPicPr>
+            <a:picLocks noChangeAspect="1"/>
+          </p:cNvPicPr>
+          <p:nvPr/>
+        </p:nvPicPr>
+        <p:blipFill>
+          <a:blip r:embed="rId9">
+            <a:extLst>
+              <a:ext uri="{28A0092B-C50C-407E-A947-70E740481C1C}">
+                <a14:useLocalDpi xmlns:a14="http://schemas.microsoft.com/office/drawing/2010/main" val="0"/>
+              </a:ext>
+            </a:extLst>
+          </a:blip>
+          <a:stretch>
+            <a:fillRect/>
+          </a:stretch>
+        </p:blipFill>
+        <p:spPr>
+          <a:xfrm>
+            <a:off x="6299157" y="3252307"/>
+            <a:ext cx="1980097" cy="760472"/>
+          </a:xfrm>
+          <a:prstGeom prst="rect">
+            <a:avLst/>
+          </a:prstGeom>
+        </p:spPr>
+      </p:pic>
     </p:spTree>
     <p:extLst>
       <p:ext uri="{BB962C8B-B14F-4D97-AF65-F5344CB8AC3E}">
@@ -6230,13 +6078,7 @@
   <p:cSld>
     <p:spTree>
       <p:nvGrpSpPr>
-        <p:cNvPr id="1" name="">
-          <a:extLst>
-            <a:ext uri="{FF2B5EF4-FFF2-40B4-BE49-F238E27FC236}">
-              <a16:creationId xmlns:a16="http://schemas.microsoft.com/office/drawing/2014/main" id="{E3075CF3-8344-7B10-6A0A-6E4EB987B37B}"/>
-            </a:ext>
-          </a:extLst>
-        </p:cNvPr>
+        <p:cNvPr id="1" name=""/>
         <p:cNvGrpSpPr/>
         <p:nvPr/>
       </p:nvGrpSpPr>
@@ -6250,628 +6092,64 @@
       </p:grpSpPr>
       <p:sp>
         <p:nvSpPr>
-          <p:cNvPr id="36" name="Rectangle 35">
-            <a:extLst>
-              <a:ext uri="{FF2B5EF4-FFF2-40B4-BE49-F238E27FC236}">
-                <a16:creationId xmlns:a16="http://schemas.microsoft.com/office/drawing/2014/main" id="{2EB6A6EA-C009-7AE9-5926-C5677EF52FC6}"/>
-              </a:ext>
-            </a:extLst>
-          </p:cNvPr>
-          <p:cNvSpPr/>
-          <p:nvPr/>
-        </p:nvSpPr>
-        <p:spPr>
-          <a:xfrm>
-            <a:off x="1346718" y="1175651"/>
-            <a:ext cx="4749272" cy="2402631"/>
-          </a:xfrm>
-          <a:prstGeom prst="rect">
-            <a:avLst/>
-          </a:prstGeom>
-          <a:solidFill>
-            <a:schemeClr val="accent6">
-              <a:lumMod val="20000"/>
-              <a:lumOff val="80000"/>
-            </a:schemeClr>
-          </a:solidFill>
-          <a:ln>
-            <a:noFill/>
-          </a:ln>
-        </p:spPr>
-        <p:style>
-          <a:lnRef idx="2">
-            <a:schemeClr val="accent1">
-              <a:shade val="15000"/>
-            </a:schemeClr>
-          </a:lnRef>
-          <a:fillRef idx="1">
-            <a:schemeClr val="accent1"/>
-          </a:fillRef>
-          <a:effectRef idx="0">
-            <a:schemeClr val="accent1"/>
-          </a:effectRef>
-          <a:fontRef idx="minor">
-            <a:schemeClr val="lt1"/>
-          </a:fontRef>
-        </p:style>
-        <p:txBody>
-          <a:bodyPr rtlCol="0" anchor="ctr"/>
-          <a:lstStyle/>
-          <a:p>
-            <a:pPr algn="ctr"/>
+          <p:cNvPr id="2" name="Title 1">
+            <a:extLst>
+              <a:ext uri="{FF2B5EF4-FFF2-40B4-BE49-F238E27FC236}">
+                <a16:creationId xmlns:a16="http://schemas.microsoft.com/office/drawing/2014/main" id="{C331BB08-137A-A69C-4BA2-9B1260E4113A}"/>
+              </a:ext>
+            </a:extLst>
+          </p:cNvPr>
+          <p:cNvSpPr>
+            <a:spLocks noGrp="1"/>
+          </p:cNvSpPr>
+          <p:nvPr>
+            <p:ph type="title"/>
+          </p:nvPr>
+        </p:nvSpPr>
+        <p:spPr/>
+        <p:txBody>
+          <a:bodyPr>
+            <a:normAutofit/>
+          </a:bodyPr>
+          <a:lstStyle/>
+          <a:p>
+            <a:r>
+              <a:rPr lang="en-GB" dirty="0"/>
+              <a:t>System Overview</a:t>
+            </a:r>
+            <a:endParaRPr lang="en-US" dirty="0"/>
+          </a:p>
+        </p:txBody>
+      </p:sp>
+      <p:sp>
+        <p:nvSpPr>
+          <p:cNvPr id="3" name="Content Placeholder 2">
+            <a:extLst>
+              <a:ext uri="{FF2B5EF4-FFF2-40B4-BE49-F238E27FC236}">
+                <a16:creationId xmlns:a16="http://schemas.microsoft.com/office/drawing/2014/main" id="{3F7B708C-6D1F-5BFA-676E-E7A622AF7E40}"/>
+              </a:ext>
+            </a:extLst>
+          </p:cNvPr>
+          <p:cNvSpPr>
+            <a:spLocks noGrp="1"/>
+          </p:cNvSpPr>
+          <p:nvPr>
+            <p:ph idx="1"/>
+          </p:nvPr>
+        </p:nvSpPr>
+        <p:spPr/>
+        <p:txBody>
+          <a:bodyPr/>
+          <a:lstStyle/>
+          <a:p>
             <a:endParaRPr lang="en-US"/>
           </a:p>
         </p:txBody>
       </p:sp>
-      <p:sp>
-        <p:nvSpPr>
-          <p:cNvPr id="2" name="Title 1">
-            <a:extLst>
-              <a:ext uri="{FF2B5EF4-FFF2-40B4-BE49-F238E27FC236}">
-                <a16:creationId xmlns:a16="http://schemas.microsoft.com/office/drawing/2014/main" id="{C3EFD915-7846-E120-11D0-2D936BF8C24B}"/>
-              </a:ext>
-            </a:extLst>
-          </p:cNvPr>
-          <p:cNvSpPr>
-            <a:spLocks noGrp="1"/>
-          </p:cNvSpPr>
-          <p:nvPr>
-            <p:ph type="title"/>
-          </p:nvPr>
-        </p:nvSpPr>
-        <p:spPr/>
-        <p:txBody>
-          <a:bodyPr/>
-          <a:lstStyle/>
-          <a:p>
-            <a:r>
-              <a:rPr lang="en-GB" dirty="0"/>
-              <a:t>/</a:t>
-            </a:r>
-            <a:r>
-              <a:rPr lang="en-GB" dirty="0" err="1"/>
-              <a:t>Market_Research</a:t>
-            </a:r>
-            <a:r>
-              <a:rPr lang="en-GB" dirty="0"/>
-              <a:t>: In Development</a:t>
-            </a:r>
-            <a:endParaRPr lang="en-US" dirty="0"/>
-          </a:p>
-        </p:txBody>
-      </p:sp>
-      <p:grpSp>
-        <p:nvGrpSpPr>
-          <p:cNvPr id="12" name="Group 11">
-            <a:extLst>
-              <a:ext uri="{FF2B5EF4-FFF2-40B4-BE49-F238E27FC236}">
-                <a16:creationId xmlns:a16="http://schemas.microsoft.com/office/drawing/2014/main" id="{6BA21AB4-FA1D-01F7-51FA-3DDA06B76CA7}"/>
-              </a:ext>
-            </a:extLst>
-          </p:cNvPr>
-          <p:cNvGrpSpPr/>
-          <p:nvPr/>
-        </p:nvGrpSpPr>
-        <p:grpSpPr>
-          <a:xfrm>
-            <a:off x="1346718" y="1175651"/>
-            <a:ext cx="9498563" cy="4805266"/>
-            <a:chOff x="1346719" y="1026367"/>
-            <a:chExt cx="9498563" cy="4805266"/>
-          </a:xfrm>
-        </p:grpSpPr>
-        <p:cxnSp>
-          <p:nvCxnSpPr>
-            <p:cNvPr id="5" name="Straight Connector 4">
-              <a:extLst>
-                <a:ext uri="{FF2B5EF4-FFF2-40B4-BE49-F238E27FC236}">
-                  <a16:creationId xmlns:a16="http://schemas.microsoft.com/office/drawing/2014/main" id="{DBF0757C-5666-8000-542F-06AE3176D9BC}"/>
-                </a:ext>
-              </a:extLst>
-            </p:cNvPr>
-            <p:cNvCxnSpPr>
-              <a:cxnSpLocks/>
-            </p:cNvCxnSpPr>
-            <p:nvPr/>
-          </p:nvCxnSpPr>
-          <p:spPr>
-            <a:xfrm>
-              <a:off x="6096000" y="1026367"/>
-              <a:ext cx="0" cy="4805266"/>
-            </a:xfrm>
-            <a:prstGeom prst="line">
-              <a:avLst/>
-            </a:prstGeom>
-            <a:ln w="28575">
-              <a:solidFill>
-                <a:schemeClr val="tx1"/>
-              </a:solidFill>
-            </a:ln>
-          </p:spPr>
-          <p:style>
-            <a:lnRef idx="2">
-              <a:schemeClr val="accent1"/>
-            </a:lnRef>
-            <a:fillRef idx="0">
-              <a:schemeClr val="accent1"/>
-            </a:fillRef>
-            <a:effectRef idx="1">
-              <a:schemeClr val="accent1"/>
-            </a:effectRef>
-            <a:fontRef idx="minor">
-              <a:schemeClr val="tx1"/>
-            </a:fontRef>
-          </p:style>
-        </p:cxnSp>
-        <p:cxnSp>
-          <p:nvCxnSpPr>
-            <p:cNvPr id="11" name="Straight Connector 10">
-              <a:extLst>
-                <a:ext uri="{FF2B5EF4-FFF2-40B4-BE49-F238E27FC236}">
-                  <a16:creationId xmlns:a16="http://schemas.microsoft.com/office/drawing/2014/main" id="{6960C7E9-12AD-C141-64BD-0F33AC3B3096}"/>
-                </a:ext>
-              </a:extLst>
-            </p:cNvPr>
-            <p:cNvCxnSpPr>
-              <a:cxnSpLocks/>
-            </p:cNvCxnSpPr>
-            <p:nvPr/>
-          </p:nvCxnSpPr>
-          <p:spPr>
-            <a:xfrm>
-              <a:off x="1346719" y="3429000"/>
-              <a:ext cx="9498563" cy="0"/>
-            </a:xfrm>
-            <a:prstGeom prst="line">
-              <a:avLst/>
-            </a:prstGeom>
-            <a:ln w="28575">
-              <a:solidFill>
-                <a:schemeClr val="tx1"/>
-              </a:solidFill>
-            </a:ln>
-          </p:spPr>
-          <p:style>
-            <a:lnRef idx="2">
-              <a:schemeClr val="accent1"/>
-            </a:lnRef>
-            <a:fillRef idx="0">
-              <a:schemeClr val="accent1"/>
-            </a:fillRef>
-            <a:effectRef idx="1">
-              <a:schemeClr val="accent1"/>
-            </a:effectRef>
-            <a:fontRef idx="minor">
-              <a:schemeClr val="tx1"/>
-            </a:fontRef>
-          </p:style>
-        </p:cxnSp>
-      </p:grpSp>
-      <p:sp>
-        <p:nvSpPr>
-          <p:cNvPr id="13" name="TextBox 12">
-            <a:extLst>
-              <a:ext uri="{FF2B5EF4-FFF2-40B4-BE49-F238E27FC236}">
-                <a16:creationId xmlns:a16="http://schemas.microsoft.com/office/drawing/2014/main" id="{D7A04935-1613-3903-E973-1AA1B1EE9D83}"/>
-              </a:ext>
-            </a:extLst>
-          </p:cNvPr>
-          <p:cNvSpPr txBox="1"/>
-          <p:nvPr/>
-        </p:nvSpPr>
-        <p:spPr>
-          <a:xfrm>
-            <a:off x="4313852" y="6178246"/>
-            <a:ext cx="3564294" cy="369332"/>
-          </a:xfrm>
-          <a:prstGeom prst="rect">
-            <a:avLst/>
-          </a:prstGeom>
-          <a:noFill/>
-        </p:spPr>
-        <p:txBody>
-          <a:bodyPr wrap="square" rtlCol="0">
-            <a:spAutoFit/>
-          </a:bodyPr>
-          <a:lstStyle/>
-          <a:p>
-            <a:pPr algn="ctr"/>
-            <a:r>
-              <a:rPr lang="en-GB" b="1" dirty="0">
-                <a:latin typeface="Arial Nova" panose="020B0504020202020204" pitchFamily="34" charset="0"/>
-              </a:rPr>
-              <a:t>Amortized cost / hour</a:t>
-            </a:r>
-            <a:endParaRPr lang="en-US" b="1" dirty="0">
-              <a:latin typeface="Arial Nova" panose="020B0504020202020204" pitchFamily="34" charset="0"/>
-            </a:endParaRPr>
-          </a:p>
-        </p:txBody>
-      </p:sp>
-      <p:sp>
-        <p:nvSpPr>
-          <p:cNvPr id="14" name="TextBox 13">
-            <a:extLst>
-              <a:ext uri="{FF2B5EF4-FFF2-40B4-BE49-F238E27FC236}">
-                <a16:creationId xmlns:a16="http://schemas.microsoft.com/office/drawing/2014/main" id="{6E09C9FE-9FBB-05DB-013D-4CFEF4E7400A}"/>
-              </a:ext>
-            </a:extLst>
-          </p:cNvPr>
-          <p:cNvSpPr txBox="1"/>
-          <p:nvPr/>
-        </p:nvSpPr>
-        <p:spPr>
-          <a:xfrm rot="16200000">
-            <a:off x="-937333" y="3393618"/>
-            <a:ext cx="3564294" cy="369332"/>
-          </a:xfrm>
-          <a:prstGeom prst="rect">
-            <a:avLst/>
-          </a:prstGeom>
-          <a:noFill/>
-        </p:spPr>
-        <p:txBody>
-          <a:bodyPr wrap="square" rtlCol="0">
-            <a:spAutoFit/>
-          </a:bodyPr>
-          <a:lstStyle/>
-          <a:p>
-            <a:pPr algn="ctr"/>
-            <a:r>
-              <a:rPr lang="en-GB" b="1" dirty="0">
-                <a:latin typeface="Arial Nova" panose="020B0504020202020204" pitchFamily="34" charset="0"/>
-              </a:rPr>
-              <a:t>Capability</a:t>
-            </a:r>
-            <a:endParaRPr lang="en-US" b="1" dirty="0">
-              <a:latin typeface="Arial Nova" panose="020B0504020202020204" pitchFamily="34" charset="0"/>
-            </a:endParaRPr>
-          </a:p>
-        </p:txBody>
-      </p:sp>
-      <p:pic>
-        <p:nvPicPr>
-          <p:cNvPr id="4" name="Picture 3" descr="A black and white logo&#10;&#10;AI-generated content may be incorrect.">
-            <a:extLst>
-              <a:ext uri="{FF2B5EF4-FFF2-40B4-BE49-F238E27FC236}">
-                <a16:creationId xmlns:a16="http://schemas.microsoft.com/office/drawing/2014/main" id="{45A50F58-F12B-8D43-2836-92572A69B69D}"/>
-              </a:ext>
-            </a:extLst>
-          </p:cNvPr>
-          <p:cNvPicPr>
-            <a:picLocks noChangeAspect="1"/>
-          </p:cNvPicPr>
-          <p:nvPr/>
-        </p:nvPicPr>
-        <p:blipFill>
-          <a:blip r:embed="rId2">
-            <a:extLst>
-              <a:ext uri="{28A0092B-C50C-407E-A947-70E740481C1C}">
-                <a14:useLocalDpi xmlns:a14="http://schemas.microsoft.com/office/drawing/2010/main" val="0"/>
-              </a:ext>
-            </a:extLst>
-          </a:blip>
-          <a:stretch>
-            <a:fillRect/>
-          </a:stretch>
-        </p:blipFill>
-        <p:spPr>
-          <a:xfrm>
-            <a:off x="3351212" y="3121489"/>
-            <a:ext cx="1286197" cy="829103"/>
-          </a:xfrm>
-          <a:prstGeom prst="rect">
-            <a:avLst/>
-          </a:prstGeom>
-        </p:spPr>
-      </p:pic>
-      <p:pic>
-        <p:nvPicPr>
-          <p:cNvPr id="7" name="Picture 6" descr="A blue and black logo&#10;&#10;AI-generated content may be incorrect.">
-            <a:extLst>
-              <a:ext uri="{FF2B5EF4-FFF2-40B4-BE49-F238E27FC236}">
-                <a16:creationId xmlns:a16="http://schemas.microsoft.com/office/drawing/2014/main" id="{245C3E9D-EEBE-C626-BF12-53AC0599B67F}"/>
-              </a:ext>
-            </a:extLst>
-          </p:cNvPr>
-          <p:cNvPicPr>
-            <a:picLocks noChangeAspect="1"/>
-          </p:cNvPicPr>
-          <p:nvPr/>
-        </p:nvPicPr>
-        <p:blipFill>
-          <a:blip r:embed="rId3">
-            <a:extLst>
-              <a:ext uri="{28A0092B-C50C-407E-A947-70E740481C1C}">
-                <a14:useLocalDpi xmlns:a14="http://schemas.microsoft.com/office/drawing/2010/main" val="0"/>
-              </a:ext>
-            </a:extLst>
-          </a:blip>
-          <a:stretch>
-            <a:fillRect/>
-          </a:stretch>
-        </p:blipFill>
-        <p:spPr>
-          <a:xfrm>
-            <a:off x="6299157" y="3252307"/>
-            <a:ext cx="1980097" cy="760472"/>
-          </a:xfrm>
-          <a:prstGeom prst="rect">
-            <a:avLst/>
-          </a:prstGeom>
-        </p:spPr>
-      </p:pic>
-      <p:pic>
-        <p:nvPicPr>
-          <p:cNvPr id="9" name="Picture 8" descr="A yellow and black logo&#10;&#10;AI-generated content may be incorrect.">
-            <a:extLst>
-              <a:ext uri="{FF2B5EF4-FFF2-40B4-BE49-F238E27FC236}">
-                <a16:creationId xmlns:a16="http://schemas.microsoft.com/office/drawing/2014/main" id="{D6A7BA31-1E0F-8C80-6441-CD6A820536ED}"/>
-              </a:ext>
-            </a:extLst>
-          </p:cNvPr>
-          <p:cNvPicPr>
-            <a:picLocks noChangeAspect="1"/>
-          </p:cNvPicPr>
-          <p:nvPr/>
-        </p:nvPicPr>
-        <p:blipFill>
-          <a:blip r:embed="rId4">
-            <a:extLst>
-              <a:ext uri="{28A0092B-C50C-407E-A947-70E740481C1C}">
-                <a14:useLocalDpi xmlns:a14="http://schemas.microsoft.com/office/drawing/2010/main" val="0"/>
-              </a:ext>
-            </a:extLst>
-          </a:blip>
-          <a:stretch>
-            <a:fillRect/>
-          </a:stretch>
-        </p:blipFill>
-        <p:spPr>
-          <a:xfrm>
-            <a:off x="2460264" y="3102033"/>
-            <a:ext cx="952500" cy="952500"/>
-          </a:xfrm>
-          <a:prstGeom prst="rect">
-            <a:avLst/>
-          </a:prstGeom>
-        </p:spPr>
-      </p:pic>
-      <p:grpSp>
-        <p:nvGrpSpPr>
-          <p:cNvPr id="10" name="Group 9">
-            <a:extLst>
-              <a:ext uri="{FF2B5EF4-FFF2-40B4-BE49-F238E27FC236}">
-                <a16:creationId xmlns:a16="http://schemas.microsoft.com/office/drawing/2014/main" id="{0232E509-301C-6D69-E5A9-BB3D743250C3}"/>
-              </a:ext>
-            </a:extLst>
-          </p:cNvPr>
-          <p:cNvGrpSpPr/>
-          <p:nvPr/>
-        </p:nvGrpSpPr>
-        <p:grpSpPr>
-          <a:xfrm>
-            <a:off x="1427048" y="2046217"/>
-            <a:ext cx="1111898" cy="2088016"/>
-            <a:chOff x="2059347" y="2046217"/>
-            <a:chExt cx="1111898" cy="2088016"/>
-          </a:xfrm>
-        </p:grpSpPr>
-        <p:pic>
-          <p:nvPicPr>
-            <p:cNvPr id="15" name="Picture 14" descr="A yellow star in a circle&#10;&#10;AI-generated content may be incorrect.">
-              <a:extLst>
-                <a:ext uri="{FF2B5EF4-FFF2-40B4-BE49-F238E27FC236}">
-                  <a16:creationId xmlns:a16="http://schemas.microsoft.com/office/drawing/2014/main" id="{6BE309FA-42D8-A03A-F7AB-2B09F272CBE9}"/>
-                </a:ext>
-              </a:extLst>
-            </p:cNvPr>
-            <p:cNvPicPr>
-              <a:picLocks noChangeAspect="1"/>
-            </p:cNvPicPr>
-            <p:nvPr/>
-          </p:nvPicPr>
-          <p:blipFill>
-            <a:blip r:embed="rId5">
-              <a:extLst>
-                <a:ext uri="{28A0092B-C50C-407E-A947-70E740481C1C}">
-                  <a14:useLocalDpi xmlns:a14="http://schemas.microsoft.com/office/drawing/2010/main" val="0"/>
-                </a:ext>
-              </a:extLst>
-            </a:blip>
-            <a:stretch>
-              <a:fillRect/>
-            </a:stretch>
-          </p:blipFill>
-          <p:spPr>
-            <a:xfrm>
-              <a:off x="2059347" y="3022335"/>
-              <a:ext cx="1111898" cy="1111898"/>
-            </a:xfrm>
-            <a:prstGeom prst="rect">
-              <a:avLst/>
-            </a:prstGeom>
-          </p:spPr>
-        </p:pic>
-        <p:sp>
-          <p:nvSpPr>
-            <p:cNvPr id="17" name="Arrow: Chevron 16">
-              <a:extLst>
-                <a:ext uri="{FF2B5EF4-FFF2-40B4-BE49-F238E27FC236}">
-                  <a16:creationId xmlns:a16="http://schemas.microsoft.com/office/drawing/2014/main" id="{05917344-DEFB-35F1-BD44-C548A0B1D878}"/>
-                </a:ext>
-              </a:extLst>
-            </p:cNvPr>
-            <p:cNvSpPr/>
-            <p:nvPr/>
-          </p:nvSpPr>
-          <p:spPr>
-            <a:xfrm rot="16200000">
-              <a:off x="2430631" y="2429455"/>
-              <a:ext cx="369331" cy="653142"/>
-            </a:xfrm>
-            <a:prstGeom prst="chevron">
-              <a:avLst/>
-            </a:prstGeom>
-            <a:solidFill>
-              <a:srgbClr val="EEB548">
-                <a:alpha val="63000"/>
-              </a:srgbClr>
-            </a:solidFill>
-            <a:ln>
-              <a:noFill/>
-            </a:ln>
-          </p:spPr>
-          <p:style>
-            <a:lnRef idx="2">
-              <a:schemeClr val="accent1">
-                <a:shade val="15000"/>
-              </a:schemeClr>
-            </a:lnRef>
-            <a:fillRef idx="1">
-              <a:schemeClr val="accent1"/>
-            </a:fillRef>
-            <a:effectRef idx="0">
-              <a:schemeClr val="accent1"/>
-            </a:effectRef>
-            <a:fontRef idx="minor">
-              <a:schemeClr val="lt1"/>
-            </a:fontRef>
-          </p:style>
-          <p:txBody>
-            <a:bodyPr rtlCol="0" anchor="ctr"/>
-            <a:lstStyle/>
-            <a:p>
-              <a:pPr algn="ctr"/>
-              <a:endParaRPr lang="en-US">
-                <a:solidFill>
-                  <a:schemeClr val="tx1"/>
-                </a:solidFill>
-              </a:endParaRPr>
-            </a:p>
-          </p:txBody>
-        </p:sp>
-        <p:sp>
-          <p:nvSpPr>
-            <p:cNvPr id="19" name="Arrow: Chevron 18">
-              <a:extLst>
-                <a:ext uri="{FF2B5EF4-FFF2-40B4-BE49-F238E27FC236}">
-                  <a16:creationId xmlns:a16="http://schemas.microsoft.com/office/drawing/2014/main" id="{188D356C-B201-B710-6EC2-159AB30A982F}"/>
-                </a:ext>
-              </a:extLst>
-            </p:cNvPr>
-            <p:cNvSpPr/>
-            <p:nvPr/>
-          </p:nvSpPr>
-          <p:spPr>
-            <a:xfrm rot="16200000">
-              <a:off x="2449343" y="2158136"/>
-              <a:ext cx="331906" cy="586958"/>
-            </a:xfrm>
-            <a:prstGeom prst="chevron">
-              <a:avLst/>
-            </a:prstGeom>
-            <a:solidFill>
-              <a:srgbClr val="EEB548">
-                <a:alpha val="36000"/>
-              </a:srgbClr>
-            </a:solidFill>
-            <a:ln>
-              <a:noFill/>
-            </a:ln>
-          </p:spPr>
-          <p:style>
-            <a:lnRef idx="2">
-              <a:schemeClr val="accent1">
-                <a:shade val="15000"/>
-              </a:schemeClr>
-            </a:lnRef>
-            <a:fillRef idx="1">
-              <a:schemeClr val="accent1"/>
-            </a:fillRef>
-            <a:effectRef idx="0">
-              <a:schemeClr val="accent1"/>
-            </a:effectRef>
-            <a:fontRef idx="minor">
-              <a:schemeClr val="lt1"/>
-            </a:fontRef>
-          </p:style>
-          <p:txBody>
-            <a:bodyPr rtlCol="0" anchor="ctr"/>
-            <a:lstStyle/>
-            <a:p>
-              <a:pPr algn="ctr"/>
-              <a:endParaRPr lang="en-US">
-                <a:solidFill>
-                  <a:schemeClr val="tx1"/>
-                </a:solidFill>
-              </a:endParaRPr>
-            </a:p>
-          </p:txBody>
-        </p:sp>
-        <p:sp>
-          <p:nvSpPr>
-            <p:cNvPr id="22" name="Arrow: Chevron 21">
-              <a:extLst>
-                <a:ext uri="{FF2B5EF4-FFF2-40B4-BE49-F238E27FC236}">
-                  <a16:creationId xmlns:a16="http://schemas.microsoft.com/office/drawing/2014/main" id="{42F7D9FE-047A-B549-A512-EBE217D9CC84}"/>
-                </a:ext>
-              </a:extLst>
-            </p:cNvPr>
-            <p:cNvSpPr/>
-            <p:nvPr/>
-          </p:nvSpPr>
-          <p:spPr>
-            <a:xfrm rot="16200000">
-              <a:off x="2472072" y="1936157"/>
-              <a:ext cx="286449" cy="506570"/>
-            </a:xfrm>
-            <a:prstGeom prst="chevron">
-              <a:avLst/>
-            </a:prstGeom>
-            <a:solidFill>
-              <a:srgbClr val="EEB548">
-                <a:alpha val="23000"/>
-              </a:srgbClr>
-            </a:solidFill>
-            <a:ln>
-              <a:noFill/>
-            </a:ln>
-          </p:spPr>
-          <p:style>
-            <a:lnRef idx="2">
-              <a:schemeClr val="accent1">
-                <a:shade val="15000"/>
-              </a:schemeClr>
-            </a:lnRef>
-            <a:fillRef idx="1">
-              <a:schemeClr val="accent1"/>
-            </a:fillRef>
-            <a:effectRef idx="0">
-              <a:schemeClr val="accent1"/>
-            </a:effectRef>
-            <a:fontRef idx="minor">
-              <a:schemeClr val="lt1"/>
-            </a:fontRef>
-          </p:style>
-          <p:txBody>
-            <a:bodyPr rtlCol="0" anchor="ctr"/>
-            <a:lstStyle/>
-            <a:p>
-              <a:pPr algn="ctr"/>
-              <a:endParaRPr lang="en-US">
-                <a:solidFill>
-                  <a:schemeClr val="tx1"/>
-                </a:solidFill>
-              </a:endParaRPr>
-            </a:p>
-          </p:txBody>
-        </p:sp>
-      </p:grpSp>
     </p:spTree>
     <p:extLst>
       <p:ext uri="{BB962C8B-B14F-4D97-AF65-F5344CB8AC3E}">
-        <p14:creationId xmlns:p14="http://schemas.microsoft.com/office/powerpoint/2010/main" val="3549725157"/>
+        <p14:creationId xmlns:p14="http://schemas.microsoft.com/office/powerpoint/2010/main" val="1577030535"/>
       </p:ext>
     </p:extLst>
   </p:cSld>
@@ -6903,7 +6181,7 @@
           <p:cNvPr id="2" name="Title 1">
             <a:extLst>
               <a:ext uri="{FF2B5EF4-FFF2-40B4-BE49-F238E27FC236}">
-                <a16:creationId xmlns:a16="http://schemas.microsoft.com/office/drawing/2014/main" id="{C331BB08-137A-A69C-4BA2-9B1260E4113A}"/>
+                <a16:creationId xmlns:a16="http://schemas.microsoft.com/office/drawing/2014/main" id="{21F2F04C-5823-D25F-EE48-9C5F2D46753D}"/>
               </a:ext>
             </a:extLst>
           </p:cNvPr>
@@ -6916,106 +6194,12 @@
         </p:nvSpPr>
         <p:spPr/>
         <p:txBody>
-          <a:bodyPr>
-            <a:normAutofit/>
-          </a:bodyPr>
+          <a:bodyPr/>
           <a:lstStyle/>
           <a:p>
             <a:r>
               <a:rPr lang="en-GB" dirty="0"/>
-              <a:t>/</a:t>
-            </a:r>
-            <a:r>
-              <a:rPr lang="en-GB" dirty="0" err="1"/>
-              <a:t>System_Overview</a:t>
-            </a:r>
-            <a:endParaRPr lang="en-US" dirty="0"/>
-          </a:p>
-        </p:txBody>
-      </p:sp>
-      <p:sp>
-        <p:nvSpPr>
-          <p:cNvPr id="3" name="Content Placeholder 2">
-            <a:extLst>
-              <a:ext uri="{FF2B5EF4-FFF2-40B4-BE49-F238E27FC236}">
-                <a16:creationId xmlns:a16="http://schemas.microsoft.com/office/drawing/2014/main" id="{3F7B708C-6D1F-5BFA-676E-E7A622AF7E40}"/>
-              </a:ext>
-            </a:extLst>
-          </p:cNvPr>
-          <p:cNvSpPr>
-            <a:spLocks noGrp="1"/>
-          </p:cNvSpPr>
-          <p:nvPr>
-            <p:ph idx="1"/>
-          </p:nvPr>
-        </p:nvSpPr>
-        <p:spPr/>
-        <p:txBody>
-          <a:bodyPr/>
-          <a:lstStyle/>
-          <a:p>
-            <a:endParaRPr lang="en-US"/>
-          </a:p>
-        </p:txBody>
-      </p:sp>
-    </p:spTree>
-    <p:extLst>
-      <p:ext uri="{BB962C8B-B14F-4D97-AF65-F5344CB8AC3E}">
-        <p14:creationId xmlns:p14="http://schemas.microsoft.com/office/powerpoint/2010/main" val="1577030535"/>
-      </p:ext>
-    </p:extLst>
-  </p:cSld>
-  <p:clrMapOvr>
-    <a:masterClrMapping/>
-  </p:clrMapOvr>
-</p:sld>
-</file>
-
-<file path=ppt/slides/slide8.xml><?xml version="1.0" encoding="utf-8"?>
-<p:sld xmlns:a="http://schemas.openxmlformats.org/drawingml/2006/main" xmlns:r="http://schemas.openxmlformats.org/officeDocument/2006/relationships" xmlns:p="http://schemas.openxmlformats.org/presentationml/2006/main">
-  <p:cSld>
-    <p:spTree>
-      <p:nvGrpSpPr>
-        <p:cNvPr id="1" name=""/>
-        <p:cNvGrpSpPr/>
-        <p:nvPr/>
-      </p:nvGrpSpPr>
-      <p:grpSpPr>
-        <a:xfrm>
-          <a:off x="0" y="0"/>
-          <a:ext cx="0" cy="0"/>
-          <a:chOff x="0" y="0"/>
-          <a:chExt cx="0" cy="0"/>
-        </a:xfrm>
-      </p:grpSpPr>
-      <p:sp>
-        <p:nvSpPr>
-          <p:cNvPr id="2" name="Title 1">
-            <a:extLst>
-              <a:ext uri="{FF2B5EF4-FFF2-40B4-BE49-F238E27FC236}">
-                <a16:creationId xmlns:a16="http://schemas.microsoft.com/office/drawing/2014/main" id="{21F2F04C-5823-D25F-EE48-9C5F2D46753D}"/>
-              </a:ext>
-            </a:extLst>
-          </p:cNvPr>
-          <p:cNvSpPr>
-            <a:spLocks noGrp="1"/>
-          </p:cNvSpPr>
-          <p:nvPr>
-            <p:ph type="title"/>
-          </p:nvPr>
-        </p:nvSpPr>
-        <p:spPr/>
-        <p:txBody>
-          <a:bodyPr/>
-          <a:lstStyle/>
-          <a:p>
-            <a:r>
-              <a:rPr lang="en-GB" dirty="0"/>
-              <a:t>/</a:t>
-            </a:r>
-            <a:r>
-              <a:rPr lang="en-GB" dirty="0" err="1"/>
-              <a:t>Technical_Contributions</a:t>
+              <a:t>Technical Contributions</a:t>
             </a:r>
             <a:endParaRPr lang="en-US" dirty="0"/>
           </a:p>
@@ -7059,7 +6243,7 @@
 </p:sld>
 </file>
 
-<file path=ppt/slides/slide9.xml><?xml version="1.0" encoding="utf-8"?>
+<file path=ppt/slides/slide8.xml><?xml version="1.0" encoding="utf-8"?>
 <p:sld xmlns:a="http://schemas.openxmlformats.org/drawingml/2006/main" xmlns:r="http://schemas.openxmlformats.org/officeDocument/2006/relationships" xmlns:p="http://schemas.openxmlformats.org/presentationml/2006/main">
   <p:cSld>
     <p:spTree>

</xml_diff>